<commit_message>
task v3 update outcome audio restructure blocks
</commit_message>
<xml_diff>
--- a/Slides/intro_format.pptx
+++ b/Slides/intro_format.pptx
@@ -210,7 +210,7 @@
           <a:p>
             <a:fld id="{F2FB56F6-5013-9F42-8807-EE52A4B55BFF}" type="datetimeFigureOut">
               <a:rPr lang="en-US" smtClean="0"/>
-              <a:t>2/5/24</a:t>
+              <a:t>3/7/24</a:t>
             </a:fld>
             <a:endParaRPr lang="en-US"/>
           </a:p>
@@ -861,7 +861,7 @@
                 <a:ea typeface="Calibri" panose="020F0502020204030204" pitchFamily="34" charset="0"/>
                 <a:cs typeface="Times New Roman" panose="02020603050405020304" pitchFamily="18" charset="0"/>
               </a:rPr>
-              <a:t>After you guess, we’ll tell you whether you were right.</a:t>
+              <a:t>After you guess, we’ll tell you whether you were right, and show you what they did next.</a:t>
             </a:r>
           </a:p>
           <a:p>
@@ -1096,7 +1096,7 @@
           <a:p>
             <a:fld id="{921CFC12-31B3-8A4A-8727-B4D7B31577E5}" type="datetimeFigureOut">
               <a:rPr lang="en-US" smtClean="0"/>
-              <a:t>2/5/24</a:t>
+              <a:t>3/7/24</a:t>
             </a:fld>
             <a:endParaRPr lang="en-US"/>
           </a:p>
@@ -1294,7 +1294,7 @@
           <a:p>
             <a:fld id="{921CFC12-31B3-8A4A-8727-B4D7B31577E5}" type="datetimeFigureOut">
               <a:rPr lang="en-US" smtClean="0"/>
-              <a:t>2/5/24</a:t>
+              <a:t>3/7/24</a:t>
             </a:fld>
             <a:endParaRPr lang="en-US"/>
           </a:p>
@@ -1502,7 +1502,7 @@
           <a:p>
             <a:fld id="{921CFC12-31B3-8A4A-8727-B4D7B31577E5}" type="datetimeFigureOut">
               <a:rPr lang="en-US" smtClean="0"/>
-              <a:t>2/5/24</a:t>
+              <a:t>3/7/24</a:t>
             </a:fld>
             <a:endParaRPr lang="en-US"/>
           </a:p>
@@ -1700,7 +1700,7 @@
           <a:p>
             <a:fld id="{921CFC12-31B3-8A4A-8727-B4D7B31577E5}" type="datetimeFigureOut">
               <a:rPr lang="en-US" smtClean="0"/>
-              <a:t>2/5/24</a:t>
+              <a:t>3/7/24</a:t>
             </a:fld>
             <a:endParaRPr lang="en-US"/>
           </a:p>
@@ -1975,7 +1975,7 @@
           <a:p>
             <a:fld id="{921CFC12-31B3-8A4A-8727-B4D7B31577E5}" type="datetimeFigureOut">
               <a:rPr lang="en-US" smtClean="0"/>
-              <a:t>2/5/24</a:t>
+              <a:t>3/7/24</a:t>
             </a:fld>
             <a:endParaRPr lang="en-US"/>
           </a:p>
@@ -2240,7 +2240,7 @@
           <a:p>
             <a:fld id="{921CFC12-31B3-8A4A-8727-B4D7B31577E5}" type="datetimeFigureOut">
               <a:rPr lang="en-US" smtClean="0"/>
-              <a:t>2/5/24</a:t>
+              <a:t>3/7/24</a:t>
             </a:fld>
             <a:endParaRPr lang="en-US"/>
           </a:p>
@@ -2652,7 +2652,7 @@
           <a:p>
             <a:fld id="{921CFC12-31B3-8A4A-8727-B4D7B31577E5}" type="datetimeFigureOut">
               <a:rPr lang="en-US" smtClean="0"/>
-              <a:t>2/5/24</a:t>
+              <a:t>3/7/24</a:t>
             </a:fld>
             <a:endParaRPr lang="en-US"/>
           </a:p>
@@ -2793,7 +2793,7 @@
           <a:p>
             <a:fld id="{921CFC12-31B3-8A4A-8727-B4D7B31577E5}" type="datetimeFigureOut">
               <a:rPr lang="en-US" smtClean="0"/>
-              <a:t>2/5/24</a:t>
+              <a:t>3/7/24</a:t>
             </a:fld>
             <a:endParaRPr lang="en-US"/>
           </a:p>
@@ -2906,7 +2906,7 @@
           <a:p>
             <a:fld id="{921CFC12-31B3-8A4A-8727-B4D7B31577E5}" type="datetimeFigureOut">
               <a:rPr lang="en-US" smtClean="0"/>
-              <a:t>2/5/24</a:t>
+              <a:t>3/7/24</a:t>
             </a:fld>
             <a:endParaRPr lang="en-US"/>
           </a:p>
@@ -3217,7 +3217,7 @@
           <a:p>
             <a:fld id="{921CFC12-31B3-8A4A-8727-B4D7B31577E5}" type="datetimeFigureOut">
               <a:rPr lang="en-US" smtClean="0"/>
-              <a:t>2/5/24</a:t>
+              <a:t>3/7/24</a:t>
             </a:fld>
             <a:endParaRPr lang="en-US"/>
           </a:p>
@@ -3505,7 +3505,7 @@
           <a:p>
             <a:fld id="{921CFC12-31B3-8A4A-8727-B4D7B31577E5}" type="datetimeFigureOut">
               <a:rPr lang="en-US" smtClean="0"/>
-              <a:t>2/5/24</a:t>
+              <a:t>3/7/24</a:t>
             </a:fld>
             <a:endParaRPr lang="en-US"/>
           </a:p>
@@ -3746,7 +3746,7 @@
           <a:p>
             <a:fld id="{921CFC12-31B3-8A4A-8727-B4D7B31577E5}" type="datetimeFigureOut">
               <a:rPr lang="en-US" smtClean="0"/>
-              <a:t>2/5/24</a:t>
+              <a:t>3/7/24</a:t>
             </a:fld>
             <a:endParaRPr lang="en-US"/>
           </a:p>
@@ -4248,10 +4248,10 @@
       </p:pic>
       <p:pic>
         <p:nvPicPr>
-          <p:cNvPr id="4" name="Audio 3">
-            <a:extLst>
-              <a:ext uri="{FF2B5EF4-FFF2-40B4-BE49-F238E27FC236}">
-                <a16:creationId xmlns:a16="http://schemas.microsoft.com/office/drawing/2014/main" id="{31974C74-0CB0-E64C-1EE9-E0E0678EB1F8}"/>
+          <p:cNvPr id="6" name="Audio 5">
+            <a:extLst>
+              <a:ext uri="{FF2B5EF4-FFF2-40B4-BE49-F238E27FC236}">
+                <a16:creationId xmlns:a16="http://schemas.microsoft.com/office/drawing/2014/main" id="{CFB4ED49-0985-6606-968D-B7E3EB3838EE}"/>
               </a:ext>
             </a:extLst>
           </p:cNvPr>
@@ -4295,10 +4295,10 @@
   </p:clrMapOvr>
   <mc:AlternateContent xmlns:mc="http://schemas.openxmlformats.org/markup-compatibility/2006">
     <mc:Choice xmlns:p14="http://schemas.microsoft.com/office/powerpoint/2010/main" Requires="p14">
-      <p:transition spd="slow" p14:dur="2000" advTm="5994"/>
+      <p:transition spd="slow" p14:dur="2000" advTm="6549"/>
     </mc:Choice>
     <mc:Fallback>
-      <p:transition spd="slow" advTm="5994"/>
+      <p:transition spd="slow" advTm="6549"/>
     </mc:Fallback>
   </mc:AlternateContent>
   <p:timing>
@@ -4334,7 +4334,7 @@
                                       <p:cBhvr>
                                         <p:cTn id="6" dur="1" fill="hold"/>
                                         <p:tgtEl>
-                                          <p:spTgt spid="4"/>
+                                          <p:spTgt spid="6"/>
                                         </p:tgtEl>
                                       </p:cBhvr>
                                     </p:cmd>
@@ -4379,7 +4379,7 @@
                   </p:endCondLst>
                 </p:cTn>
                 <p:tgtEl>
-                  <p:spTgt spid="4"/>
+                  <p:spTgt spid="6"/>
                 </p:tgtEl>
               </p:cMediaNode>
             </p:audio>
@@ -4599,10 +4599,10 @@
       </p:pic>
       <p:pic>
         <p:nvPicPr>
-          <p:cNvPr id="8" name="Audio 7">
-            <a:extLst>
-              <a:ext uri="{FF2B5EF4-FFF2-40B4-BE49-F238E27FC236}">
-                <a16:creationId xmlns:a16="http://schemas.microsoft.com/office/drawing/2014/main" id="{B89A6E9F-C939-ED65-0F63-068387DBADE8}"/>
+          <p:cNvPr id="9" name="Audio 8">
+            <a:extLst>
+              <a:ext uri="{FF2B5EF4-FFF2-40B4-BE49-F238E27FC236}">
+                <a16:creationId xmlns:a16="http://schemas.microsoft.com/office/drawing/2014/main" id="{D4979F0D-2BD9-98AA-4D4E-B850DF07EDAA}"/>
               </a:ext>
             </a:extLst>
           </p:cNvPr>
@@ -4646,10 +4646,10 @@
   </p:clrMapOvr>
   <mc:AlternateContent xmlns:mc="http://schemas.openxmlformats.org/markup-compatibility/2006">
     <mc:Choice xmlns:p14="http://schemas.microsoft.com/office/powerpoint/2010/main" Requires="p14">
-      <p:transition spd="slow" p14:dur="2000" advTm="6016"/>
+      <p:transition spd="slow" p14:dur="2000" advTm="5781"/>
     </mc:Choice>
     <mc:Fallback>
-      <p:transition spd="slow" advTm="6016"/>
+      <p:transition spd="slow" advTm="5781"/>
     </mc:Fallback>
   </mc:AlternateContent>
   <p:timing>
@@ -4685,7 +4685,7 @@
                                       <p:cBhvr>
                                         <p:cTn id="6" dur="1" fill="hold"/>
                                         <p:tgtEl>
-                                          <p:spTgt spid="8"/>
+                                          <p:spTgt spid="9"/>
                                         </p:tgtEl>
                                       </p:cBhvr>
                                     </p:cmd>
@@ -4730,7 +4730,7 @@
                   </p:endCondLst>
                 </p:cTn>
                 <p:tgtEl>
-                  <p:spTgt spid="8"/>
+                  <p:spTgt spid="9"/>
                 </p:tgtEl>
               </p:cMediaNode>
             </p:audio>
@@ -5115,10 +5115,10 @@
       </p:grpSp>
       <p:pic>
         <p:nvPicPr>
-          <p:cNvPr id="4" name="Audio 3">
-            <a:extLst>
-              <a:ext uri="{FF2B5EF4-FFF2-40B4-BE49-F238E27FC236}">
-                <a16:creationId xmlns:a16="http://schemas.microsoft.com/office/drawing/2014/main" id="{CE5D927F-68BB-64C5-6813-32F395EA30BC}"/>
+          <p:cNvPr id="5" name="Audio 4">
+            <a:extLst>
+              <a:ext uri="{FF2B5EF4-FFF2-40B4-BE49-F238E27FC236}">
+                <a16:creationId xmlns:a16="http://schemas.microsoft.com/office/drawing/2014/main" id="{53FDEEFF-B7BD-59F0-BEC5-F4F2935BCAC0}"/>
               </a:ext>
             </a:extLst>
           </p:cNvPr>
@@ -5162,10 +5162,10 @@
   </p:clrMapOvr>
   <mc:AlternateContent xmlns:mc="http://schemas.openxmlformats.org/markup-compatibility/2006">
     <mc:Choice xmlns:p14="http://schemas.microsoft.com/office/powerpoint/2010/main" Requires="p14">
-      <p:transition spd="slow" p14:dur="2000" advTm="10133"/>
+      <p:transition spd="slow" p14:dur="2000" advTm="13770"/>
     </mc:Choice>
     <mc:Fallback>
-      <p:transition spd="slow" advTm="10133"/>
+      <p:transition spd="slow" advTm="13770"/>
     </mc:Fallback>
   </mc:AlternateContent>
   <p:timing>
@@ -5201,7 +5201,7 @@
                                       <p:cBhvr>
                                         <p:cTn id="6" dur="1" fill="hold"/>
                                         <p:tgtEl>
-                                          <p:spTgt spid="4"/>
+                                          <p:spTgt spid="5"/>
                                         </p:tgtEl>
                                       </p:cBhvr>
                                     </p:cmd>
@@ -5246,7 +5246,7 @@
                   </p:endCondLst>
                 </p:cTn>
                 <p:tgtEl>
-                  <p:spTgt spid="4"/>
+                  <p:spTgt spid="5"/>
                 </p:tgtEl>
               </p:cMediaNode>
             </p:audio>

</xml_diff>